<commit_message>
Made first draft of slides
</commit_message>
<xml_diff>
--- a/10_28_ch1/slides/slides_ch1.pptx
+++ b/10_28_ch1/slides/slides_ch1.pptx
@@ -8,6 +8,14 @@
     <p:sldId id="256" r:id="rId2"/>
     <p:sldId id="257" r:id="rId3"/>
     <p:sldId id="258" r:id="rId4"/>
+    <p:sldId id="259" r:id="rId5"/>
+    <p:sldId id="260" r:id="rId6"/>
+    <p:sldId id="261" r:id="rId7"/>
+    <p:sldId id="262" r:id="rId8"/>
+    <p:sldId id="263" r:id="rId9"/>
+    <p:sldId id="264" r:id="rId10"/>
+    <p:sldId id="265" r:id="rId11"/>
+    <p:sldId id="266" r:id="rId12"/>
   </p:sldIdLst>
   <p:sldSz cx="12192000" cy="6858000"/>
   <p:notesSz cx="6858000" cy="9144000"/>
@@ -3408,6 +3416,226 @@
 </p:sld>
 </file>
 
+<file path=ppt/slides/slide10.xml><?xml version="1.0" encoding="utf-8"?>
+<p:sld xmlns:a="http://schemas.openxmlformats.org/drawingml/2006/main" xmlns:r="http://schemas.openxmlformats.org/officeDocument/2006/relationships" xmlns:p="http://schemas.openxmlformats.org/presentationml/2006/main">
+  <p:cSld>
+    <p:spTree>
+      <p:nvGrpSpPr>
+        <p:cNvPr id="1" name=""/>
+        <p:cNvGrpSpPr/>
+        <p:nvPr/>
+      </p:nvGrpSpPr>
+      <p:grpSpPr>
+        <a:xfrm>
+          <a:off x="0" y="0"/>
+          <a:ext cx="0" cy="0"/>
+          <a:chOff x="0" y="0"/>
+          <a:chExt cx="0" cy="0"/>
+        </a:xfrm>
+      </p:grpSpPr>
+      <p:sp>
+        <p:nvSpPr>
+          <p:cNvPr id="2" name="Title 1">
+            <a:extLst>
+              <a:ext uri="{FF2B5EF4-FFF2-40B4-BE49-F238E27FC236}">
+                <a16:creationId xmlns:a16="http://schemas.microsoft.com/office/drawing/2014/main" id="{B6792E06-123D-CB44-B204-D5B2358F0A5F}"/>
+              </a:ext>
+            </a:extLst>
+          </p:cNvPr>
+          <p:cNvSpPr>
+            <a:spLocks noGrp="1"/>
+          </p:cNvSpPr>
+          <p:nvPr>
+            <p:ph type="title"/>
+          </p:nvPr>
+        </p:nvSpPr>
+        <p:spPr/>
+        <p:txBody>
+          <a:bodyPr/>
+          <a:lstStyle/>
+          <a:p>
+            <a:r>
+              <a:rPr lang="en-US" dirty="0"/>
+              <a:t>Our example today – substitution mutations</a:t>
+            </a:r>
+          </a:p>
+        </p:txBody>
+      </p:sp>
+      <p:sp>
+        <p:nvSpPr>
+          <p:cNvPr id="3" name="Content Placeholder 2">
+            <a:extLst>
+              <a:ext uri="{FF2B5EF4-FFF2-40B4-BE49-F238E27FC236}">
+                <a16:creationId xmlns:a16="http://schemas.microsoft.com/office/drawing/2014/main" id="{2B9CB3FC-E67C-8D4E-8207-44C77E54D9A1}"/>
+              </a:ext>
+            </a:extLst>
+          </p:cNvPr>
+          <p:cNvSpPr>
+            <a:spLocks noGrp="1"/>
+          </p:cNvSpPr>
+          <p:nvPr>
+            <p:ph idx="1"/>
+          </p:nvPr>
+        </p:nvSpPr>
+        <p:spPr/>
+        <p:txBody>
+          <a:bodyPr/>
+          <a:lstStyle/>
+          <a:p>
+            <a:r>
+              <a:rPr lang="en-US" dirty="0"/>
+              <a:t>We say a base pair either mutates or does not (note: the outcome doesn’t need to be binary to be discrete, we could also say A-&gt;G, A-&gt;C, A-&gt;T, A-&gt;A </a:t>
+            </a:r>
+            <a:r>
+              <a:rPr lang="en-US" dirty="0" err="1"/>
+              <a:t>etc</a:t>
+            </a:r>
+            <a:r>
+              <a:rPr lang="en-US" dirty="0"/>
+              <a:t> are the sample space of discrete events)</a:t>
+            </a:r>
+          </a:p>
+          <a:p>
+            <a:r>
+              <a:rPr lang="en-US" dirty="0"/>
+              <a:t>We can only have whole base pairs</a:t>
+            </a:r>
+          </a:p>
+        </p:txBody>
+      </p:sp>
+    </p:spTree>
+    <p:extLst>
+      <p:ext uri="{BB962C8B-B14F-4D97-AF65-F5344CB8AC3E}">
+        <p14:creationId xmlns:p14="http://schemas.microsoft.com/office/powerpoint/2010/main" val="3834924342"/>
+      </p:ext>
+    </p:extLst>
+  </p:cSld>
+  <p:clrMapOvr>
+    <a:masterClrMapping/>
+  </p:clrMapOvr>
+</p:sld>
+</file>
+
+<file path=ppt/slides/slide11.xml><?xml version="1.0" encoding="utf-8"?>
+<p:sld xmlns:a="http://schemas.openxmlformats.org/drawingml/2006/main" xmlns:r="http://schemas.openxmlformats.org/officeDocument/2006/relationships" xmlns:p="http://schemas.openxmlformats.org/presentationml/2006/main">
+  <p:cSld>
+    <p:spTree>
+      <p:nvGrpSpPr>
+        <p:cNvPr id="1" name=""/>
+        <p:cNvGrpSpPr/>
+        <p:nvPr/>
+      </p:nvGrpSpPr>
+      <p:grpSpPr>
+        <a:xfrm>
+          <a:off x="0" y="0"/>
+          <a:ext cx="0" cy="0"/>
+          <a:chOff x="0" y="0"/>
+          <a:chExt cx="0" cy="0"/>
+        </a:xfrm>
+      </p:grpSpPr>
+      <p:sp>
+        <p:nvSpPr>
+          <p:cNvPr id="2" name="Title 1">
+            <a:extLst>
+              <a:ext uri="{FF2B5EF4-FFF2-40B4-BE49-F238E27FC236}">
+                <a16:creationId xmlns:a16="http://schemas.microsoft.com/office/drawing/2014/main" id="{DF263ED5-7FFE-4B44-AE36-0984F94262FD}"/>
+              </a:ext>
+            </a:extLst>
+          </p:cNvPr>
+          <p:cNvSpPr>
+            <a:spLocks noGrp="1"/>
+          </p:cNvSpPr>
+          <p:nvPr>
+            <p:ph type="title"/>
+          </p:nvPr>
+        </p:nvSpPr>
+        <p:spPr/>
+        <p:txBody>
+          <a:bodyPr/>
+          <a:lstStyle/>
+          <a:p>
+            <a:r>
+              <a:rPr lang="en-US" dirty="0"/>
+              <a:t>For Next Time: Try This</a:t>
+            </a:r>
+          </a:p>
+        </p:txBody>
+      </p:sp>
+      <p:pic>
+        <p:nvPicPr>
+          <p:cNvPr id="4" name="Content Placeholder 3">
+            <a:extLst>
+              <a:ext uri="{FF2B5EF4-FFF2-40B4-BE49-F238E27FC236}">
+                <a16:creationId xmlns:a16="http://schemas.microsoft.com/office/drawing/2014/main" id="{E5B2E4F5-77C2-C04A-BBD8-B69C00DCAFA6}"/>
+              </a:ext>
+            </a:extLst>
+          </p:cNvPr>
+          <p:cNvPicPr>
+            <a:picLocks noGrp="1" noChangeAspect="1"/>
+          </p:cNvPicPr>
+          <p:nvPr>
+            <p:ph idx="1"/>
+          </p:nvPr>
+        </p:nvPicPr>
+        <p:blipFill>
+          <a:blip r:embed="rId2"/>
+          <a:stretch>
+            <a:fillRect/>
+          </a:stretch>
+        </p:blipFill>
+        <p:spPr>
+          <a:xfrm>
+            <a:off x="7228702" y="2032684"/>
+            <a:ext cx="4674108" cy="3253768"/>
+          </a:xfrm>
+          <a:prstGeom prst="rect">
+            <a:avLst/>
+          </a:prstGeom>
+        </p:spPr>
+      </p:pic>
+      <p:pic>
+        <p:nvPicPr>
+          <p:cNvPr id="5" name="Picture 4">
+            <a:extLst>
+              <a:ext uri="{FF2B5EF4-FFF2-40B4-BE49-F238E27FC236}">
+                <a16:creationId xmlns:a16="http://schemas.microsoft.com/office/drawing/2014/main" id="{058D3B85-12CF-454B-B0F0-B7614CC444AB}"/>
+              </a:ext>
+            </a:extLst>
+          </p:cNvPr>
+          <p:cNvPicPr>
+            <a:picLocks noChangeAspect="1"/>
+          </p:cNvPicPr>
+          <p:nvPr/>
+        </p:nvPicPr>
+        <p:blipFill>
+          <a:blip r:embed="rId3"/>
+          <a:stretch>
+            <a:fillRect/>
+          </a:stretch>
+        </p:blipFill>
+        <p:spPr>
+          <a:xfrm>
+            <a:off x="721674" y="1520911"/>
+            <a:ext cx="6250791" cy="2138657"/>
+          </a:xfrm>
+          <a:prstGeom prst="rect">
+            <a:avLst/>
+          </a:prstGeom>
+        </p:spPr>
+      </p:pic>
+    </p:spTree>
+    <p:extLst>
+      <p:ext uri="{BB962C8B-B14F-4D97-AF65-F5344CB8AC3E}">
+        <p14:creationId xmlns:p14="http://schemas.microsoft.com/office/powerpoint/2010/main" val="2349144138"/>
+      </p:ext>
+    </p:extLst>
+  </p:cSld>
+  <p:clrMapOvr>
+    <a:masterClrMapping/>
+  </p:clrMapOvr>
+</p:sld>
+</file>
+
 <file path=ppt/slides/slide2.xml><?xml version="1.0" encoding="utf-8"?>
 <p:sld xmlns:a="http://schemas.openxmlformats.org/drawingml/2006/main" xmlns:r="http://schemas.openxmlformats.org/officeDocument/2006/relationships" xmlns:p="http://schemas.openxmlformats.org/presentationml/2006/main">
   <p:cSld>
@@ -3516,10 +3744,9 @@
               <a:t>github</a:t>
             </a:r>
             <a:r>
-              <a:rPr lang="en-US"/>
+              <a:rPr lang="en-US" dirty="0"/>
               <a:t> demo)</a:t>
             </a:r>
-            <a:endParaRPr lang="en-US" dirty="0"/>
           </a:p>
         </p:txBody>
       </p:sp>
@@ -3566,32 +3793,35 @@
             <a:spLocks noGrp="1"/>
           </p:cNvSpPr>
           <p:nvPr>
-            <p:ph type="title"/>
-          </p:nvPr>
-        </p:nvSpPr>
-        <p:spPr/>
-        <p:txBody>
-          <a:bodyPr/>
-          <a:lstStyle/>
-          <a:p>
-            <a:endParaRPr lang="en-US"/>
-          </a:p>
-        </p:txBody>
-      </p:sp>
-      <p:sp>
-        <p:nvSpPr>
-          <p:cNvPr id="3" name="Content Placeholder 2">
-            <a:extLst>
-              <a:ext uri="{FF2B5EF4-FFF2-40B4-BE49-F238E27FC236}">
-                <a16:creationId xmlns:a16="http://schemas.microsoft.com/office/drawing/2014/main" id="{D2A97435-1F2A-464B-BFD0-34F6DE023CFC}"/>
-              </a:ext>
-            </a:extLst>
-          </p:cNvPr>
-          <p:cNvSpPr>
-            <a:spLocks noGrp="1"/>
-          </p:cNvSpPr>
-          <p:nvPr>
-            <p:ph idx="1"/>
+            <p:ph type="ctrTitle"/>
+          </p:nvPr>
+        </p:nvSpPr>
+        <p:spPr/>
+        <p:txBody>
+          <a:bodyPr/>
+          <a:lstStyle/>
+          <a:p>
+            <a:r>
+              <a:rPr lang="en-US" dirty="0"/>
+              <a:t>What is a simulation?</a:t>
+            </a:r>
+          </a:p>
+        </p:txBody>
+      </p:sp>
+      <p:sp>
+        <p:nvSpPr>
+          <p:cNvPr id="4" name="Subtitle 3">
+            <a:extLst>
+              <a:ext uri="{FF2B5EF4-FFF2-40B4-BE49-F238E27FC236}">
+                <a16:creationId xmlns:a16="http://schemas.microsoft.com/office/drawing/2014/main" id="{A76A01E9-2C46-F840-B261-F36B0525A728}"/>
+              </a:ext>
+            </a:extLst>
+          </p:cNvPr>
+          <p:cNvSpPr>
+            <a:spLocks noGrp="1"/>
+          </p:cNvSpPr>
+          <p:nvPr>
+            <p:ph type="subTitle" idx="1"/>
           </p:nvPr>
         </p:nvSpPr>
         <p:spPr/>
@@ -3607,6 +3837,588 @@
     <p:extLst>
       <p:ext uri="{BB962C8B-B14F-4D97-AF65-F5344CB8AC3E}">
         <p14:creationId xmlns:p14="http://schemas.microsoft.com/office/powerpoint/2010/main" val="3520268431"/>
+      </p:ext>
+    </p:extLst>
+  </p:cSld>
+  <p:clrMapOvr>
+    <a:masterClrMapping/>
+  </p:clrMapOvr>
+</p:sld>
+</file>
+
+<file path=ppt/slides/slide4.xml><?xml version="1.0" encoding="utf-8"?>
+<p:sld xmlns:a="http://schemas.openxmlformats.org/drawingml/2006/main" xmlns:r="http://schemas.openxmlformats.org/officeDocument/2006/relationships" xmlns:p="http://schemas.openxmlformats.org/presentationml/2006/main">
+  <p:cSld>
+    <p:spTree>
+      <p:nvGrpSpPr>
+        <p:cNvPr id="1" name=""/>
+        <p:cNvGrpSpPr/>
+        <p:nvPr/>
+      </p:nvGrpSpPr>
+      <p:grpSpPr>
+        <a:xfrm>
+          <a:off x="0" y="0"/>
+          <a:ext cx="0" cy="0"/>
+          <a:chOff x="0" y="0"/>
+          <a:chExt cx="0" cy="0"/>
+        </a:xfrm>
+      </p:grpSpPr>
+      <p:sp>
+        <p:nvSpPr>
+          <p:cNvPr id="2" name="Title 1">
+            <a:extLst>
+              <a:ext uri="{FF2B5EF4-FFF2-40B4-BE49-F238E27FC236}">
+                <a16:creationId xmlns:a16="http://schemas.microsoft.com/office/drawing/2014/main" id="{8391F5CC-49F4-704A-A031-0FA1080E6CBA}"/>
+              </a:ext>
+            </a:extLst>
+          </p:cNvPr>
+          <p:cNvSpPr>
+            <a:spLocks noGrp="1"/>
+          </p:cNvSpPr>
+          <p:nvPr>
+            <p:ph type="title"/>
+          </p:nvPr>
+        </p:nvSpPr>
+        <p:spPr/>
+        <p:txBody>
+          <a:bodyPr/>
+          <a:lstStyle/>
+          <a:p>
+            <a:r>
+              <a:rPr lang="en-US" dirty="0"/>
+              <a:t>What is a discrete event?</a:t>
+            </a:r>
+          </a:p>
+        </p:txBody>
+      </p:sp>
+      <p:sp>
+        <p:nvSpPr>
+          <p:cNvPr id="3" name="Content Placeholder 2">
+            <a:extLst>
+              <a:ext uri="{FF2B5EF4-FFF2-40B4-BE49-F238E27FC236}">
+                <a16:creationId xmlns:a16="http://schemas.microsoft.com/office/drawing/2014/main" id="{98F441D4-9DEC-054B-8919-E71BD9E74CC8}"/>
+              </a:ext>
+            </a:extLst>
+          </p:cNvPr>
+          <p:cNvSpPr>
+            <a:spLocks noGrp="1"/>
+          </p:cNvSpPr>
+          <p:nvPr>
+            <p:ph idx="1"/>
+          </p:nvPr>
+        </p:nvSpPr>
+        <p:spPr/>
+        <p:txBody>
+          <a:bodyPr/>
+          <a:lstStyle/>
+          <a:p>
+            <a:r>
+              <a:rPr lang="en-US" dirty="0"/>
+              <a:t>Discrete vs. Continuous</a:t>
+            </a:r>
+          </a:p>
+        </p:txBody>
+      </p:sp>
+    </p:spTree>
+    <p:extLst>
+      <p:ext uri="{BB962C8B-B14F-4D97-AF65-F5344CB8AC3E}">
+        <p14:creationId xmlns:p14="http://schemas.microsoft.com/office/powerpoint/2010/main" val="3956591689"/>
+      </p:ext>
+    </p:extLst>
+  </p:cSld>
+  <p:clrMapOvr>
+    <a:masterClrMapping/>
+  </p:clrMapOvr>
+</p:sld>
+</file>
+
+<file path=ppt/slides/slide5.xml><?xml version="1.0" encoding="utf-8"?>
+<p:sld xmlns:a="http://schemas.openxmlformats.org/drawingml/2006/main" xmlns:r="http://schemas.openxmlformats.org/officeDocument/2006/relationships" xmlns:p="http://schemas.openxmlformats.org/presentationml/2006/main">
+  <p:cSld>
+    <p:spTree>
+      <p:nvGrpSpPr>
+        <p:cNvPr id="1" name=""/>
+        <p:cNvGrpSpPr/>
+        <p:nvPr/>
+      </p:nvGrpSpPr>
+      <p:grpSpPr>
+        <a:xfrm>
+          <a:off x="0" y="0"/>
+          <a:ext cx="0" cy="0"/>
+          <a:chOff x="0" y="0"/>
+          <a:chExt cx="0" cy="0"/>
+        </a:xfrm>
+      </p:grpSpPr>
+      <p:sp>
+        <p:nvSpPr>
+          <p:cNvPr id="2" name="Title 1">
+            <a:extLst>
+              <a:ext uri="{FF2B5EF4-FFF2-40B4-BE49-F238E27FC236}">
+                <a16:creationId xmlns:a16="http://schemas.microsoft.com/office/drawing/2014/main" id="{8391F5CC-49F4-704A-A031-0FA1080E6CBA}"/>
+              </a:ext>
+            </a:extLst>
+          </p:cNvPr>
+          <p:cNvSpPr>
+            <a:spLocks noGrp="1"/>
+          </p:cNvSpPr>
+          <p:nvPr>
+            <p:ph type="title"/>
+          </p:nvPr>
+        </p:nvSpPr>
+        <p:spPr/>
+        <p:txBody>
+          <a:bodyPr/>
+          <a:lstStyle/>
+          <a:p>
+            <a:r>
+              <a:rPr lang="en-US" dirty="0"/>
+              <a:t>What is a discrete event?</a:t>
+            </a:r>
+          </a:p>
+        </p:txBody>
+      </p:sp>
+      <p:sp>
+        <p:nvSpPr>
+          <p:cNvPr id="3" name="Content Placeholder 2">
+            <a:extLst>
+              <a:ext uri="{FF2B5EF4-FFF2-40B4-BE49-F238E27FC236}">
+                <a16:creationId xmlns:a16="http://schemas.microsoft.com/office/drawing/2014/main" id="{98F441D4-9DEC-054B-8919-E71BD9E74CC8}"/>
+              </a:ext>
+            </a:extLst>
+          </p:cNvPr>
+          <p:cNvSpPr>
+            <a:spLocks noGrp="1"/>
+          </p:cNvSpPr>
+          <p:nvPr>
+            <p:ph idx="1"/>
+          </p:nvPr>
+        </p:nvSpPr>
+        <p:spPr/>
+        <p:txBody>
+          <a:bodyPr/>
+          <a:lstStyle/>
+          <a:p>
+            <a:r>
+              <a:rPr lang="en-US" dirty="0"/>
+              <a:t>Discrete vs. Continuous</a:t>
+            </a:r>
+          </a:p>
+          <a:p>
+            <a:r>
+              <a:rPr lang="en-US" dirty="0"/>
+              <a:t>The three ingredients to having a notion of probability</a:t>
+            </a:r>
+          </a:p>
+        </p:txBody>
+      </p:sp>
+    </p:spTree>
+    <p:extLst>
+      <p:ext uri="{BB962C8B-B14F-4D97-AF65-F5344CB8AC3E}">
+        <p14:creationId xmlns:p14="http://schemas.microsoft.com/office/powerpoint/2010/main" val="4260157778"/>
+      </p:ext>
+    </p:extLst>
+  </p:cSld>
+  <p:clrMapOvr>
+    <a:masterClrMapping/>
+  </p:clrMapOvr>
+</p:sld>
+</file>
+
+<file path=ppt/slides/slide6.xml><?xml version="1.0" encoding="utf-8"?>
+<p:sld xmlns:a="http://schemas.openxmlformats.org/drawingml/2006/main" xmlns:r="http://schemas.openxmlformats.org/officeDocument/2006/relationships" xmlns:p="http://schemas.openxmlformats.org/presentationml/2006/main">
+  <p:cSld>
+    <p:spTree>
+      <p:nvGrpSpPr>
+        <p:cNvPr id="1" name=""/>
+        <p:cNvGrpSpPr/>
+        <p:nvPr/>
+      </p:nvGrpSpPr>
+      <p:grpSpPr>
+        <a:xfrm>
+          <a:off x="0" y="0"/>
+          <a:ext cx="0" cy="0"/>
+          <a:chOff x="0" y="0"/>
+          <a:chExt cx="0" cy="0"/>
+        </a:xfrm>
+      </p:grpSpPr>
+      <p:sp>
+        <p:nvSpPr>
+          <p:cNvPr id="2" name="Title 1">
+            <a:extLst>
+              <a:ext uri="{FF2B5EF4-FFF2-40B4-BE49-F238E27FC236}">
+                <a16:creationId xmlns:a16="http://schemas.microsoft.com/office/drawing/2014/main" id="{8391F5CC-49F4-704A-A031-0FA1080E6CBA}"/>
+              </a:ext>
+            </a:extLst>
+          </p:cNvPr>
+          <p:cNvSpPr>
+            <a:spLocks noGrp="1"/>
+          </p:cNvSpPr>
+          <p:nvPr>
+            <p:ph type="title"/>
+          </p:nvPr>
+        </p:nvSpPr>
+        <p:spPr/>
+        <p:txBody>
+          <a:bodyPr/>
+          <a:lstStyle/>
+          <a:p>
+            <a:r>
+              <a:rPr lang="en-US" dirty="0"/>
+              <a:t>What is a discrete event?</a:t>
+            </a:r>
+          </a:p>
+        </p:txBody>
+      </p:sp>
+      <p:sp>
+        <p:nvSpPr>
+          <p:cNvPr id="3" name="Content Placeholder 2">
+            <a:extLst>
+              <a:ext uri="{FF2B5EF4-FFF2-40B4-BE49-F238E27FC236}">
+                <a16:creationId xmlns:a16="http://schemas.microsoft.com/office/drawing/2014/main" id="{98F441D4-9DEC-054B-8919-E71BD9E74CC8}"/>
+              </a:ext>
+            </a:extLst>
+          </p:cNvPr>
+          <p:cNvSpPr>
+            <a:spLocks noGrp="1"/>
+          </p:cNvSpPr>
+          <p:nvPr>
+            <p:ph idx="1"/>
+          </p:nvPr>
+        </p:nvSpPr>
+        <p:spPr/>
+        <p:txBody>
+          <a:bodyPr/>
+          <a:lstStyle/>
+          <a:p>
+            <a:r>
+              <a:rPr lang="en-US" dirty="0"/>
+              <a:t>Discrete vs. Continuous</a:t>
+            </a:r>
+          </a:p>
+          <a:p>
+            <a:r>
+              <a:rPr lang="en-US" dirty="0"/>
+              <a:t>The three ingredients to having a notion of probability</a:t>
+            </a:r>
+          </a:p>
+          <a:p>
+            <a:pPr lvl="1"/>
+            <a:r>
+              <a:rPr lang="en-US" dirty="0"/>
+              <a:t>Sample space</a:t>
+            </a:r>
+          </a:p>
+        </p:txBody>
+      </p:sp>
+    </p:spTree>
+    <p:extLst>
+      <p:ext uri="{BB962C8B-B14F-4D97-AF65-F5344CB8AC3E}">
+        <p14:creationId xmlns:p14="http://schemas.microsoft.com/office/powerpoint/2010/main" val="3889961646"/>
+      </p:ext>
+    </p:extLst>
+  </p:cSld>
+  <p:clrMapOvr>
+    <a:masterClrMapping/>
+  </p:clrMapOvr>
+</p:sld>
+</file>
+
+<file path=ppt/slides/slide7.xml><?xml version="1.0" encoding="utf-8"?>
+<p:sld xmlns:a="http://schemas.openxmlformats.org/drawingml/2006/main" xmlns:r="http://schemas.openxmlformats.org/officeDocument/2006/relationships" xmlns:p="http://schemas.openxmlformats.org/presentationml/2006/main">
+  <p:cSld>
+    <p:spTree>
+      <p:nvGrpSpPr>
+        <p:cNvPr id="1" name=""/>
+        <p:cNvGrpSpPr/>
+        <p:nvPr/>
+      </p:nvGrpSpPr>
+      <p:grpSpPr>
+        <a:xfrm>
+          <a:off x="0" y="0"/>
+          <a:ext cx="0" cy="0"/>
+          <a:chOff x="0" y="0"/>
+          <a:chExt cx="0" cy="0"/>
+        </a:xfrm>
+      </p:grpSpPr>
+      <p:sp>
+        <p:nvSpPr>
+          <p:cNvPr id="2" name="Title 1">
+            <a:extLst>
+              <a:ext uri="{FF2B5EF4-FFF2-40B4-BE49-F238E27FC236}">
+                <a16:creationId xmlns:a16="http://schemas.microsoft.com/office/drawing/2014/main" id="{8391F5CC-49F4-704A-A031-0FA1080E6CBA}"/>
+              </a:ext>
+            </a:extLst>
+          </p:cNvPr>
+          <p:cNvSpPr>
+            <a:spLocks noGrp="1"/>
+          </p:cNvSpPr>
+          <p:nvPr>
+            <p:ph type="title"/>
+          </p:nvPr>
+        </p:nvSpPr>
+        <p:spPr/>
+        <p:txBody>
+          <a:bodyPr/>
+          <a:lstStyle/>
+          <a:p>
+            <a:r>
+              <a:rPr lang="en-US" dirty="0"/>
+              <a:t>What is a discrete event?</a:t>
+            </a:r>
+          </a:p>
+        </p:txBody>
+      </p:sp>
+      <p:sp>
+        <p:nvSpPr>
+          <p:cNvPr id="3" name="Content Placeholder 2">
+            <a:extLst>
+              <a:ext uri="{FF2B5EF4-FFF2-40B4-BE49-F238E27FC236}">
+                <a16:creationId xmlns:a16="http://schemas.microsoft.com/office/drawing/2014/main" id="{98F441D4-9DEC-054B-8919-E71BD9E74CC8}"/>
+              </a:ext>
+            </a:extLst>
+          </p:cNvPr>
+          <p:cNvSpPr>
+            <a:spLocks noGrp="1"/>
+          </p:cNvSpPr>
+          <p:nvPr>
+            <p:ph idx="1"/>
+          </p:nvPr>
+        </p:nvSpPr>
+        <p:spPr/>
+        <p:txBody>
+          <a:bodyPr/>
+          <a:lstStyle/>
+          <a:p>
+            <a:r>
+              <a:rPr lang="en-US" dirty="0"/>
+              <a:t>Discrete vs. Continuous</a:t>
+            </a:r>
+          </a:p>
+          <a:p>
+            <a:r>
+              <a:rPr lang="en-US" dirty="0"/>
+              <a:t>The three ingredients to having a notion of probability</a:t>
+            </a:r>
+          </a:p>
+          <a:p>
+            <a:pPr lvl="1"/>
+            <a:r>
+              <a:rPr lang="en-US" dirty="0"/>
+              <a:t>Sample space</a:t>
+            </a:r>
+          </a:p>
+          <a:p>
+            <a:pPr lvl="1"/>
+            <a:r>
+              <a:rPr lang="en-US" dirty="0"/>
+              <a:t>List of events (sigma algebra)</a:t>
+            </a:r>
+          </a:p>
+        </p:txBody>
+      </p:sp>
+    </p:spTree>
+    <p:extLst>
+      <p:ext uri="{BB962C8B-B14F-4D97-AF65-F5344CB8AC3E}">
+        <p14:creationId xmlns:p14="http://schemas.microsoft.com/office/powerpoint/2010/main" val="1878062422"/>
+      </p:ext>
+    </p:extLst>
+  </p:cSld>
+  <p:clrMapOvr>
+    <a:masterClrMapping/>
+  </p:clrMapOvr>
+</p:sld>
+</file>
+
+<file path=ppt/slides/slide8.xml><?xml version="1.0" encoding="utf-8"?>
+<p:sld xmlns:a="http://schemas.openxmlformats.org/drawingml/2006/main" xmlns:r="http://schemas.openxmlformats.org/officeDocument/2006/relationships" xmlns:p="http://schemas.openxmlformats.org/presentationml/2006/main">
+  <p:cSld>
+    <p:spTree>
+      <p:nvGrpSpPr>
+        <p:cNvPr id="1" name=""/>
+        <p:cNvGrpSpPr/>
+        <p:nvPr/>
+      </p:nvGrpSpPr>
+      <p:grpSpPr>
+        <a:xfrm>
+          <a:off x="0" y="0"/>
+          <a:ext cx="0" cy="0"/>
+          <a:chOff x="0" y="0"/>
+          <a:chExt cx="0" cy="0"/>
+        </a:xfrm>
+      </p:grpSpPr>
+      <p:sp>
+        <p:nvSpPr>
+          <p:cNvPr id="2" name="Title 1">
+            <a:extLst>
+              <a:ext uri="{FF2B5EF4-FFF2-40B4-BE49-F238E27FC236}">
+                <a16:creationId xmlns:a16="http://schemas.microsoft.com/office/drawing/2014/main" id="{8391F5CC-49F4-704A-A031-0FA1080E6CBA}"/>
+              </a:ext>
+            </a:extLst>
+          </p:cNvPr>
+          <p:cNvSpPr>
+            <a:spLocks noGrp="1"/>
+          </p:cNvSpPr>
+          <p:nvPr>
+            <p:ph type="title"/>
+          </p:nvPr>
+        </p:nvSpPr>
+        <p:spPr/>
+        <p:txBody>
+          <a:bodyPr/>
+          <a:lstStyle/>
+          <a:p>
+            <a:r>
+              <a:rPr lang="en-US" dirty="0"/>
+              <a:t>What is a discrete event?</a:t>
+            </a:r>
+          </a:p>
+        </p:txBody>
+      </p:sp>
+      <p:sp>
+        <p:nvSpPr>
+          <p:cNvPr id="3" name="Content Placeholder 2">
+            <a:extLst>
+              <a:ext uri="{FF2B5EF4-FFF2-40B4-BE49-F238E27FC236}">
+                <a16:creationId xmlns:a16="http://schemas.microsoft.com/office/drawing/2014/main" id="{98F441D4-9DEC-054B-8919-E71BD9E74CC8}"/>
+              </a:ext>
+            </a:extLst>
+          </p:cNvPr>
+          <p:cNvSpPr>
+            <a:spLocks noGrp="1"/>
+          </p:cNvSpPr>
+          <p:nvPr>
+            <p:ph idx="1"/>
+          </p:nvPr>
+        </p:nvSpPr>
+        <p:spPr/>
+        <p:txBody>
+          <a:bodyPr/>
+          <a:lstStyle/>
+          <a:p>
+            <a:r>
+              <a:rPr lang="en-US" dirty="0"/>
+              <a:t>Discrete vs. Continuous</a:t>
+            </a:r>
+          </a:p>
+          <a:p>
+            <a:r>
+              <a:rPr lang="en-US" dirty="0"/>
+              <a:t>The three ingredients to having a notion of probability</a:t>
+            </a:r>
+          </a:p>
+          <a:p>
+            <a:pPr lvl="1"/>
+            <a:r>
+              <a:rPr lang="en-US" dirty="0"/>
+              <a:t>Sample space</a:t>
+            </a:r>
+          </a:p>
+          <a:p>
+            <a:pPr lvl="1"/>
+            <a:r>
+              <a:rPr lang="en-US" dirty="0"/>
+              <a:t>List of events (sigma algebra)</a:t>
+            </a:r>
+          </a:p>
+          <a:p>
+            <a:pPr lvl="1"/>
+            <a:r>
+              <a:rPr lang="en-US" dirty="0"/>
+              <a:t>Probability measure (function on sigma algebra -&gt; numbers)</a:t>
+            </a:r>
+          </a:p>
+          <a:p>
+            <a:endParaRPr lang="en-US" dirty="0"/>
+          </a:p>
+        </p:txBody>
+      </p:sp>
+    </p:spTree>
+    <p:extLst>
+      <p:ext uri="{BB962C8B-B14F-4D97-AF65-F5344CB8AC3E}">
+        <p14:creationId xmlns:p14="http://schemas.microsoft.com/office/powerpoint/2010/main" val="3670570244"/>
+      </p:ext>
+    </p:extLst>
+  </p:cSld>
+  <p:clrMapOvr>
+    <a:masterClrMapping/>
+  </p:clrMapOvr>
+</p:sld>
+</file>
+
+<file path=ppt/slides/slide9.xml><?xml version="1.0" encoding="utf-8"?>
+<p:sld xmlns:a="http://schemas.openxmlformats.org/drawingml/2006/main" xmlns:r="http://schemas.openxmlformats.org/officeDocument/2006/relationships" xmlns:p="http://schemas.openxmlformats.org/presentationml/2006/main">
+  <p:cSld>
+    <p:spTree>
+      <p:nvGrpSpPr>
+        <p:cNvPr id="1" name=""/>
+        <p:cNvGrpSpPr/>
+        <p:nvPr/>
+      </p:nvGrpSpPr>
+      <p:grpSpPr>
+        <a:xfrm>
+          <a:off x="0" y="0"/>
+          <a:ext cx="0" cy="0"/>
+          <a:chOff x="0" y="0"/>
+          <a:chExt cx="0" cy="0"/>
+        </a:xfrm>
+      </p:grpSpPr>
+      <p:sp>
+        <p:nvSpPr>
+          <p:cNvPr id="2" name="Title 1">
+            <a:extLst>
+              <a:ext uri="{FF2B5EF4-FFF2-40B4-BE49-F238E27FC236}">
+                <a16:creationId xmlns:a16="http://schemas.microsoft.com/office/drawing/2014/main" id="{9E8A9297-DCD3-B34C-9EBA-05143D8F50C8}"/>
+              </a:ext>
+            </a:extLst>
+          </p:cNvPr>
+          <p:cNvSpPr>
+            <a:spLocks noGrp="1"/>
+          </p:cNvSpPr>
+          <p:nvPr>
+            <p:ph type="ctrTitle"/>
+          </p:nvPr>
+        </p:nvSpPr>
+        <p:spPr/>
+        <p:txBody>
+          <a:bodyPr/>
+          <a:lstStyle/>
+          <a:p>
+            <a:r>
+              <a:rPr lang="en-US" dirty="0"/>
+              <a:t>What are discrete events in biology?</a:t>
+            </a:r>
+          </a:p>
+        </p:txBody>
+      </p:sp>
+      <p:sp>
+        <p:nvSpPr>
+          <p:cNvPr id="4" name="Subtitle 3">
+            <a:extLst>
+              <a:ext uri="{FF2B5EF4-FFF2-40B4-BE49-F238E27FC236}">
+                <a16:creationId xmlns:a16="http://schemas.microsoft.com/office/drawing/2014/main" id="{E5BBB337-533C-D142-9E52-E7A937D7CC8E}"/>
+              </a:ext>
+            </a:extLst>
+          </p:cNvPr>
+          <p:cNvSpPr>
+            <a:spLocks noGrp="1"/>
+          </p:cNvSpPr>
+          <p:nvPr>
+            <p:ph type="subTitle" idx="1"/>
+          </p:nvPr>
+        </p:nvSpPr>
+        <p:spPr/>
+        <p:txBody>
+          <a:bodyPr/>
+          <a:lstStyle/>
+          <a:p>
+            <a:endParaRPr lang="en-US"/>
+          </a:p>
+        </p:txBody>
+      </p:sp>
+    </p:spTree>
+    <p:extLst>
+      <p:ext uri="{BB962C8B-B14F-4D97-AF65-F5344CB8AC3E}">
+        <p14:creationId xmlns:p14="http://schemas.microsoft.com/office/powerpoint/2010/main" val="4158884424"/>
       </p:ext>
     </p:extLst>
   </p:cSld>

</xml_diff>